<commit_message>
testing/intro: update diagram of test cases
</commit_message>
<xml_diff>
--- a/diagrams/testing/introduction/what/diagram.pptx
+++ b/diagrams/testing/introduction/what/diagram.pptx
@@ -104,6 +104,22 @@
       </a:defRPr>
     </a:lvl9pPr>
   </p:defaultTextStyle>
+  <p:extLst>
+    <p:ext uri="{EFAFB233-063F-42B5-8137-9DF3F51BA10A}">
+      <p15:sldGuideLst xmlns:p15="http://schemas.microsoft.com/office/powerpoint/2012/main">
+        <p15:guide id="1" orient="horz" pos="2160">
+          <p15:clr>
+            <a:srgbClr val="A4A3A4"/>
+          </p15:clr>
+        </p15:guide>
+        <p15:guide id="2" pos="2880">
+          <p15:clr>
+            <a:srgbClr val="A4A3A4"/>
+          </p15:clr>
+        </p15:guide>
+      </p15:sldGuideLst>
+    </p:ext>
+  </p:extLst>
 </p:presentation>
 </file>
 
@@ -288,7 +304,7 @@
           <a:p>
             <a:fld id="{D46955CB-CB1C-408F-913A-84196CE11D6C}" type="datetimeFigureOut">
               <a:rPr lang="en-SG" smtClean="0"/>
-              <a:t>13/7/2017</a:t>
+              <a:t>14/8/2017</a:t>
             </a:fld>
             <a:endParaRPr lang="en-SG"/>
           </a:p>
@@ -458,7 +474,7 @@
           <a:p>
             <a:fld id="{D46955CB-CB1C-408F-913A-84196CE11D6C}" type="datetimeFigureOut">
               <a:rPr lang="en-SG" smtClean="0"/>
-              <a:t>13/7/2017</a:t>
+              <a:t>14/8/2017</a:t>
             </a:fld>
             <a:endParaRPr lang="en-SG"/>
           </a:p>
@@ -638,7 +654,7 @@
           <a:p>
             <a:fld id="{D46955CB-CB1C-408F-913A-84196CE11D6C}" type="datetimeFigureOut">
               <a:rPr lang="en-SG" smtClean="0"/>
-              <a:t>13/7/2017</a:t>
+              <a:t>14/8/2017</a:t>
             </a:fld>
             <a:endParaRPr lang="en-SG"/>
           </a:p>
@@ -808,7 +824,7 @@
           <a:p>
             <a:fld id="{D46955CB-CB1C-408F-913A-84196CE11D6C}" type="datetimeFigureOut">
               <a:rPr lang="en-SG" smtClean="0"/>
-              <a:t>13/7/2017</a:t>
+              <a:t>14/8/2017</a:t>
             </a:fld>
             <a:endParaRPr lang="en-SG"/>
           </a:p>
@@ -1054,7 +1070,7 @@
           <a:p>
             <a:fld id="{D46955CB-CB1C-408F-913A-84196CE11D6C}" type="datetimeFigureOut">
               <a:rPr lang="en-SG" smtClean="0"/>
-              <a:t>13/7/2017</a:t>
+              <a:t>14/8/2017</a:t>
             </a:fld>
             <a:endParaRPr lang="en-SG"/>
           </a:p>
@@ -1342,7 +1358,7 @@
           <a:p>
             <a:fld id="{D46955CB-CB1C-408F-913A-84196CE11D6C}" type="datetimeFigureOut">
               <a:rPr lang="en-SG" smtClean="0"/>
-              <a:t>13/7/2017</a:t>
+              <a:t>14/8/2017</a:t>
             </a:fld>
             <a:endParaRPr lang="en-SG"/>
           </a:p>
@@ -1764,7 +1780,7 @@
           <a:p>
             <a:fld id="{D46955CB-CB1C-408F-913A-84196CE11D6C}" type="datetimeFigureOut">
               <a:rPr lang="en-SG" smtClean="0"/>
-              <a:t>13/7/2017</a:t>
+              <a:t>14/8/2017</a:t>
             </a:fld>
             <a:endParaRPr lang="en-SG"/>
           </a:p>
@@ -1882,7 +1898,7 @@
           <a:p>
             <a:fld id="{D46955CB-CB1C-408F-913A-84196CE11D6C}" type="datetimeFigureOut">
               <a:rPr lang="en-SG" smtClean="0"/>
-              <a:t>13/7/2017</a:t>
+              <a:t>14/8/2017</a:t>
             </a:fld>
             <a:endParaRPr lang="en-SG"/>
           </a:p>
@@ -1977,7 +1993,7 @@
           <a:p>
             <a:fld id="{D46955CB-CB1C-408F-913A-84196CE11D6C}" type="datetimeFigureOut">
               <a:rPr lang="en-SG" smtClean="0"/>
-              <a:t>13/7/2017</a:t>
+              <a:t>14/8/2017</a:t>
             </a:fld>
             <a:endParaRPr lang="en-SG"/>
           </a:p>
@@ -2254,7 +2270,7 @@
           <a:p>
             <a:fld id="{D46955CB-CB1C-408F-913A-84196CE11D6C}" type="datetimeFigureOut">
               <a:rPr lang="en-SG" smtClean="0"/>
-              <a:t>13/7/2017</a:t>
+              <a:t>14/8/2017</a:t>
             </a:fld>
             <a:endParaRPr lang="en-SG"/>
           </a:p>
@@ -2507,7 +2523,7 @@
           <a:p>
             <a:fld id="{D46955CB-CB1C-408F-913A-84196CE11D6C}" type="datetimeFigureOut">
               <a:rPr lang="en-SG" smtClean="0"/>
-              <a:t>13/7/2017</a:t>
+              <a:t>14/8/2017</a:t>
             </a:fld>
             <a:endParaRPr lang="en-SG"/>
           </a:p>
@@ -2720,7 +2736,7 @@
           <a:p>
             <a:fld id="{D46955CB-CB1C-408F-913A-84196CE11D6C}" type="datetimeFigureOut">
               <a:rPr lang="en-SG" smtClean="0"/>
-              <a:t>13/7/2017</a:t>
+              <a:t>14/8/2017</a:t>
             </a:fld>
             <a:endParaRPr lang="en-SG"/>
           </a:p>
@@ -3097,7 +3113,7 @@
       </p:grpSpPr>
       <p:sp>
         <p:nvSpPr>
-          <p:cNvPr id="4" name="Rectangle 10"/>
+          <p:cNvPr id="18" name="Rectangle 10"/>
           <p:cNvSpPr>
             <a:spLocks noChangeArrowheads="1"/>
           </p:cNvSpPr>
@@ -3105,7 +3121,7 @@
         </p:nvSpPr>
         <p:spPr bwMode="auto">
           <a:xfrm>
-            <a:off x="2057400" y="2408283"/>
+            <a:off x="1305800" y="2107668"/>
             <a:ext cx="3048000" cy="2057400"/>
           </a:xfrm>
           <a:prstGeom prst="rect">
@@ -3139,6 +3155,105 @@
           </a:bodyPr>
           <a:lstStyle/>
           <a:p>
+            <a:endParaRPr lang="en-US" dirty="0"/>
+          </a:p>
+        </p:txBody>
+      </p:sp>
+      <p:sp>
+        <p:nvSpPr>
+          <p:cNvPr id="17" name="Rectangle 10"/>
+          <p:cNvSpPr>
+            <a:spLocks noChangeArrowheads="1"/>
+          </p:cNvSpPr>
+          <p:nvPr/>
+        </p:nvSpPr>
+        <p:spPr bwMode="auto">
+          <a:xfrm>
+            <a:off x="1435280" y="2239498"/>
+            <a:ext cx="3048000" cy="2057400"/>
+          </a:xfrm>
+          <a:prstGeom prst="rect">
+            <a:avLst/>
+          </a:prstGeom>
+          <a:solidFill>
+            <a:schemeClr val="bg1"/>
+          </a:solidFill>
+          <a:ln>
+            <a:headEnd/>
+            <a:tailEnd/>
+          </a:ln>
+        </p:spPr>
+        <p:style>
+          <a:lnRef idx="1">
+            <a:schemeClr val="accent6"/>
+          </a:lnRef>
+          <a:fillRef idx="2">
+            <a:schemeClr val="accent6"/>
+          </a:fillRef>
+          <a:effectRef idx="1">
+            <a:schemeClr val="accent6"/>
+          </a:effectRef>
+          <a:fontRef idx="minor">
+            <a:schemeClr val="dk1"/>
+          </a:fontRef>
+        </p:style>
+        <p:txBody>
+          <a:bodyPr anchor="ctr">
+            <a:spAutoFit/>
+          </a:bodyPr>
+          <a:lstStyle/>
+          <a:p>
+            <a:endParaRPr lang="en-US" dirty="0"/>
+          </a:p>
+        </p:txBody>
+      </p:sp>
+      <p:sp>
+        <p:nvSpPr>
+          <p:cNvPr id="4" name="Rectangle 10"/>
+          <p:cNvSpPr>
+            <a:spLocks noChangeArrowheads="1"/>
+          </p:cNvSpPr>
+          <p:nvPr/>
+        </p:nvSpPr>
+        <p:spPr bwMode="auto">
+          <a:xfrm>
+            <a:off x="1564760" y="2371328"/>
+            <a:ext cx="3048000" cy="2057400"/>
+          </a:xfrm>
+          <a:prstGeom prst="rect">
+            <a:avLst/>
+          </a:prstGeom>
+          <a:solidFill>
+            <a:schemeClr val="accent6">
+              <a:lumMod val="20000"/>
+              <a:lumOff val="80000"/>
+            </a:schemeClr>
+          </a:solidFill>
+          <a:ln>
+            <a:headEnd/>
+            <a:tailEnd/>
+          </a:ln>
+        </p:spPr>
+        <p:style>
+          <a:lnRef idx="1">
+            <a:schemeClr val="accent6"/>
+          </a:lnRef>
+          <a:fillRef idx="2">
+            <a:schemeClr val="accent6"/>
+          </a:fillRef>
+          <a:effectRef idx="1">
+            <a:schemeClr val="accent6"/>
+          </a:effectRef>
+          <a:fontRef idx="minor">
+            <a:schemeClr val="dk1"/>
+          </a:fontRef>
+        </p:style>
+        <p:txBody>
+          <a:bodyPr anchor="ctr">
+            <a:spAutoFit/>
+          </a:bodyPr>
+          <a:lstStyle/>
+          <a:p>
             <a:endParaRPr lang="en-US"/>
           </a:p>
         </p:txBody>
@@ -3153,7 +3268,7 @@
         </p:nvSpPr>
         <p:spPr bwMode="auto">
           <a:xfrm>
-            <a:off x="3505200" y="4618083"/>
+            <a:off x="3012560" y="4581128"/>
             <a:ext cx="2819400" cy="1145138"/>
           </a:xfrm>
           <a:prstGeom prst="cube">
@@ -3190,7 +3305,7 @@
               </a:spcBef>
             </a:pPr>
             <a:r>
-              <a:rPr lang="en-US" sz="2000" b="0" dirty="0" smtClean="0">
+              <a:rPr lang="en-US" sz="2000" b="1" dirty="0" smtClean="0">
                 <a:solidFill>
                   <a:schemeClr val="tx1"/>
                 </a:solidFill>
@@ -3199,7 +3314,7 @@
               <a:t>Software </a:t>
             </a:r>
             <a:r>
-              <a:rPr lang="en-US" sz="2000" b="0" dirty="0">
+              <a:rPr lang="en-US" sz="2000" b="1" dirty="0">
                 <a:solidFill>
                   <a:schemeClr val="tx1"/>
                 </a:solidFill>
@@ -3208,7 +3323,7 @@
               <a:t>Under </a:t>
             </a:r>
             <a:r>
-              <a:rPr lang="en-US" sz="2000" b="0" dirty="0" smtClean="0">
+              <a:rPr lang="en-US" sz="2000" b="1" dirty="0" smtClean="0">
                 <a:solidFill>
                   <a:schemeClr val="tx1"/>
                 </a:solidFill>
@@ -3224,7 +3339,7 @@
               </a:spcBef>
             </a:pPr>
             <a:r>
-              <a:rPr lang="en-US" sz="2000" b="0" dirty="0" smtClean="0">
+              <a:rPr lang="en-US" sz="2000" b="1" dirty="0" smtClean="0">
                 <a:solidFill>
                   <a:schemeClr val="tx1"/>
                 </a:solidFill>
@@ -3232,7 +3347,7 @@
               </a:rPr>
               <a:t>(SUT)</a:t>
             </a:r>
-            <a:endParaRPr lang="en-US" sz="2000" b="0" dirty="0">
+            <a:endParaRPr lang="en-US" sz="2000" b="1" dirty="0">
               <a:solidFill>
                 <a:schemeClr val="tx1"/>
               </a:solidFill>
@@ -3251,7 +3366,7 @@
         </p:nvSpPr>
         <p:spPr bwMode="auto">
           <a:xfrm>
-            <a:off x="2209800" y="3627483"/>
+            <a:off x="1717160" y="3590528"/>
             <a:ext cx="1295400" cy="685800"/>
           </a:xfrm>
           <a:prstGeom prst="foldedCorner">
@@ -3263,6 +3378,7 @@
             <a:headEnd/>
             <a:tailEnd/>
           </a:ln>
+          <a:effectLst/>
         </p:spPr>
         <p:style>
           <a:lnRef idx="1">
@@ -3305,7 +3421,7 @@
         </p:nvSpPr>
         <p:spPr bwMode="auto">
           <a:xfrm>
-            <a:off x="6324600" y="3627483"/>
+            <a:off x="5940896" y="3650853"/>
             <a:ext cx="1295400" cy="685800"/>
           </a:xfrm>
           <a:prstGeom prst="foldedCorner">
@@ -3317,77 +3433,7 @@
             <a:headEnd/>
             <a:tailEnd/>
           </a:ln>
-        </p:spPr>
-        <p:style>
-          <a:lnRef idx="1">
-            <a:schemeClr val="accent2"/>
-          </a:lnRef>
-          <a:fillRef idx="2">
-            <a:schemeClr val="accent2"/>
-          </a:fillRef>
-          <a:effectRef idx="1">
-            <a:schemeClr val="accent2"/>
-          </a:effectRef>
-          <a:fontRef idx="minor">
-            <a:schemeClr val="dk1"/>
-          </a:fontRef>
-        </p:style>
-        <p:txBody>
-          <a:bodyPr wrap="none" anchor="ctr"/>
-          <a:lstStyle/>
-          <a:p>
-            <a:pPr algn="ctr"/>
-            <a:r>
-              <a:rPr lang="en-US" sz="2000" b="0">
-                <a:solidFill>
-                  <a:schemeClr val="tx1"/>
-                </a:solidFill>
-                <a:latin typeface="Calibri" pitchFamily="34" charset="0"/>
-              </a:rPr>
-              <a:t>Actual </a:t>
-            </a:r>
-            <a:br>
-              <a:rPr lang="en-US" sz="2000" b="0">
-                <a:solidFill>
-                  <a:schemeClr val="tx1"/>
-                </a:solidFill>
-                <a:latin typeface="Calibri" pitchFamily="34" charset="0"/>
-              </a:rPr>
-            </a:br>
-            <a:r>
-              <a:rPr lang="en-US" sz="2000" b="0">
-                <a:solidFill>
-                  <a:schemeClr val="tx1"/>
-                </a:solidFill>
-                <a:latin typeface="Calibri" pitchFamily="34" charset="0"/>
-              </a:rPr>
-              <a:t>output</a:t>
-            </a:r>
-          </a:p>
-        </p:txBody>
-      </p:sp>
-      <p:sp>
-        <p:nvSpPr>
-          <p:cNvPr id="8" name="AutoShape 9"/>
-          <p:cNvSpPr>
-            <a:spLocks noChangeArrowheads="1"/>
-          </p:cNvSpPr>
-          <p:nvPr/>
-        </p:nvSpPr>
-        <p:spPr bwMode="auto">
-          <a:xfrm>
-            <a:off x="3657600" y="3627483"/>
-            <a:ext cx="1295400" cy="685800"/>
-          </a:xfrm>
-          <a:prstGeom prst="foldedCorner">
-            <a:avLst>
-              <a:gd name="adj" fmla="val 12500"/>
-            </a:avLst>
-          </a:prstGeom>
-          <a:ln>
-            <a:headEnd/>
-            <a:tailEnd/>
-          </a:ln>
+          <a:effectLst/>
         </p:spPr>
         <p:style>
           <a:lnRef idx="1">
@@ -3412,7 +3458,7 @@
               <a:rPr lang="en-US" sz="2000">
                 <a:latin typeface="Calibri" pitchFamily="34" charset="0"/>
               </a:rPr>
-              <a:t>Expected </a:t>
+              <a:t>Actual </a:t>
             </a:r>
             <a:br>
               <a:rPr lang="en-US" sz="2000">
@@ -3430,6 +3476,69 @@
       </p:sp>
       <p:sp>
         <p:nvSpPr>
+          <p:cNvPr id="8" name="AutoShape 9"/>
+          <p:cNvSpPr>
+            <a:spLocks noChangeArrowheads="1"/>
+          </p:cNvSpPr>
+          <p:nvPr/>
+        </p:nvSpPr>
+        <p:spPr bwMode="auto">
+          <a:xfrm>
+            <a:off x="3164960" y="3590528"/>
+            <a:ext cx="1295400" cy="685800"/>
+          </a:xfrm>
+          <a:prstGeom prst="foldedCorner">
+            <a:avLst>
+              <a:gd name="adj" fmla="val 12500"/>
+            </a:avLst>
+          </a:prstGeom>
+          <a:ln>
+            <a:headEnd/>
+            <a:tailEnd/>
+          </a:ln>
+          <a:effectLst/>
+        </p:spPr>
+        <p:style>
+          <a:lnRef idx="1">
+            <a:schemeClr val="accent5"/>
+          </a:lnRef>
+          <a:fillRef idx="2">
+            <a:schemeClr val="accent5"/>
+          </a:fillRef>
+          <a:effectRef idx="1">
+            <a:schemeClr val="accent5"/>
+          </a:effectRef>
+          <a:fontRef idx="minor">
+            <a:schemeClr val="dk1"/>
+          </a:fontRef>
+        </p:style>
+        <p:txBody>
+          <a:bodyPr wrap="none" anchor="ctr"/>
+          <a:lstStyle/>
+          <a:p>
+            <a:pPr algn="ctr"/>
+            <a:r>
+              <a:rPr lang="en-US" sz="2000">
+                <a:latin typeface="Calibri" pitchFamily="34" charset="0"/>
+              </a:rPr>
+              <a:t>Expected </a:t>
+            </a:r>
+            <a:br>
+              <a:rPr lang="en-US" sz="2000">
+                <a:latin typeface="Calibri" pitchFamily="34" charset="0"/>
+              </a:rPr>
+            </a:br>
+            <a:r>
+              <a:rPr lang="en-US" sz="2000">
+                <a:latin typeface="Calibri" pitchFamily="34" charset="0"/>
+              </a:rPr>
+              <a:t>output</a:t>
+            </a:r>
+          </a:p>
+        </p:txBody>
+      </p:sp>
+      <p:sp>
+        <p:nvSpPr>
           <p:cNvPr id="9" name="Text Box 11"/>
           <p:cNvSpPr txBox="1">
             <a:spLocks noChangeArrowheads="1"/>
@@ -3438,7 +3547,7 @@
         </p:nvSpPr>
         <p:spPr bwMode="auto">
           <a:xfrm>
-            <a:off x="2133600" y="2408283"/>
+            <a:off x="1640960" y="2371328"/>
             <a:ext cx="3200400" cy="1158875"/>
           </a:xfrm>
           <a:prstGeom prst="rect">
@@ -3464,7 +3573,7 @@
               </a:spcBef>
             </a:pPr>
             <a:r>
-              <a:rPr lang="en-US" sz="2000" dirty="0">
+              <a:rPr lang="en-US" sz="2000" b="1" dirty="0">
                 <a:solidFill>
                   <a:schemeClr val="tx1"/>
                 </a:solidFill>
@@ -3510,100 +3619,222 @@
       </p:sp>
       <p:sp>
         <p:nvSpPr>
-          <p:cNvPr id="10" name="AutoShape 12"/>
+          <p:cNvPr id="12" name="AutoShape 14"/>
           <p:cNvSpPr>
             <a:spLocks noChangeArrowheads="1"/>
           </p:cNvSpPr>
           <p:nvPr/>
         </p:nvSpPr>
         <p:spPr bwMode="auto">
-          <a:xfrm flipV="1">
-            <a:off x="2667000" y="4286296"/>
-            <a:ext cx="611188" cy="1150937"/>
+          <a:xfrm>
+            <a:off x="4483280" y="3583750"/>
+            <a:ext cx="1456872" cy="337075"/>
           </a:xfrm>
-          <a:custGeom>
-            <a:avLst/>
-            <a:gdLst>
-              <a:gd name="T0" fmla="*/ 2147483647 w 21600"/>
-              <a:gd name="T1" fmla="*/ 0 h 21600"/>
-              <a:gd name="T2" fmla="*/ 2147483647 w 21600"/>
-              <a:gd name="T3" fmla="*/ 2147483647 h 21600"/>
-              <a:gd name="T4" fmla="*/ 2147483647 w 21600"/>
-              <a:gd name="T5" fmla="*/ 2147483647 h 21600"/>
-              <a:gd name="T6" fmla="*/ 2147483647 w 21600"/>
-              <a:gd name="T7" fmla="*/ 2147483647 h 21600"/>
-              <a:gd name="T8" fmla="*/ 17694720 60000 65536"/>
-              <a:gd name="T9" fmla="*/ 5898240 60000 65536"/>
-              <a:gd name="T10" fmla="*/ 5898240 60000 65536"/>
-              <a:gd name="T11" fmla="*/ 0 60000 65536"/>
-              <a:gd name="T12" fmla="*/ 12427 w 21600"/>
-              <a:gd name="T13" fmla="*/ 2912 h 21600"/>
-              <a:gd name="T14" fmla="*/ 18227 w 21600"/>
-              <a:gd name="T15" fmla="*/ 9246 h 21600"/>
-            </a:gdLst>
-            <a:ahLst/>
-            <a:cxnLst>
-              <a:cxn ang="T8">
-                <a:pos x="T0" y="T1"/>
-              </a:cxn>
-              <a:cxn ang="T9">
-                <a:pos x="T2" y="T3"/>
-              </a:cxn>
-              <a:cxn ang="T10">
-                <a:pos x="T4" y="T5"/>
-              </a:cxn>
-              <a:cxn ang="T11">
-                <a:pos x="T6" y="T7"/>
-              </a:cxn>
-            </a:cxnLst>
-            <a:rect l="T12" t="T13" r="T14" b="T15"/>
-            <a:pathLst>
-              <a:path w="21600" h="21600">
-                <a:moveTo>
-                  <a:pt x="21600" y="6079"/>
-                </a:moveTo>
-                <a:lnTo>
-                  <a:pt x="15126" y="0"/>
-                </a:lnTo>
-                <a:lnTo>
-                  <a:pt x="15126" y="2912"/>
-                </a:lnTo>
-                <a:lnTo>
-                  <a:pt x="12427" y="2912"/>
-                </a:lnTo>
-                <a:cubicBezTo>
-                  <a:pt x="5564" y="2912"/>
-                  <a:pt x="0" y="7052"/>
-                  <a:pt x="0" y="12158"/>
-                </a:cubicBezTo>
-                <a:lnTo>
-                  <a:pt x="0" y="21600"/>
-                </a:lnTo>
-                <a:lnTo>
-                  <a:pt x="6474" y="21600"/>
-                </a:lnTo>
-                <a:lnTo>
-                  <a:pt x="6474" y="12158"/>
-                </a:lnTo>
-                <a:cubicBezTo>
-                  <a:pt x="6474" y="10550"/>
-                  <a:pt x="9139" y="9246"/>
-                  <a:pt x="12427" y="9246"/>
-                </a:cubicBezTo>
-                <a:lnTo>
-                  <a:pt x="15126" y="9246"/>
-                </a:lnTo>
-                <a:lnTo>
-                  <a:pt x="15126" y="12158"/>
-                </a:lnTo>
-                <a:close/>
-              </a:path>
-            </a:pathLst>
-          </a:custGeom>
+          <a:prstGeom prst="leftRightArrow">
+            <a:avLst>
+              <a:gd name="adj1" fmla="val 50000"/>
+              <a:gd name="adj2" fmla="val 35903"/>
+            </a:avLst>
+          </a:prstGeom>
+          <a:solidFill>
+            <a:srgbClr val="7030A0"/>
+          </a:solidFill>
           <a:ln>
+            <a:solidFill>
+              <a:srgbClr val="7030A0"/>
+            </a:solidFill>
             <a:headEnd/>
             <a:tailEnd/>
           </a:ln>
+          <a:effectLst>
+            <a:outerShdw blurRad="63500" sx="102000" sy="102000" algn="ctr" rotWithShape="0">
+              <a:prstClr val="black">
+                <a:alpha val="40000"/>
+              </a:prstClr>
+            </a:outerShdw>
+          </a:effectLst>
+        </p:spPr>
+        <p:style>
+          <a:lnRef idx="2">
+            <a:schemeClr val="accent4"/>
+          </a:lnRef>
+          <a:fillRef idx="1">
+            <a:schemeClr val="lt1"/>
+          </a:fillRef>
+          <a:effectRef idx="0">
+            <a:schemeClr val="accent4"/>
+          </a:effectRef>
+          <a:fontRef idx="minor">
+            <a:schemeClr val="dk1"/>
+          </a:fontRef>
+        </p:style>
+        <p:txBody>
+          <a:bodyPr anchor="ctr">
+            <a:noAutofit/>
+          </a:bodyPr>
+          <a:lstStyle/>
+          <a:p>
+            <a:pPr algn="ctr"/>
+            <a:endParaRPr lang="en-US" sz="2000" b="0" dirty="0">
+              <a:solidFill>
+                <a:schemeClr val="tx1"/>
+              </a:solidFill>
+              <a:latin typeface="Calibri" pitchFamily="34" charset="0"/>
+            </a:endParaRPr>
+          </a:p>
+        </p:txBody>
+      </p:sp>
+      <p:sp>
+        <p:nvSpPr>
+          <p:cNvPr id="2" name="Rectangle 1"/>
+          <p:cNvSpPr/>
+          <p:nvPr/>
+        </p:nvSpPr>
+        <p:spPr>
+          <a:xfrm>
+            <a:off x="5940152" y="5014647"/>
+            <a:ext cx="1800200" cy="646331"/>
+          </a:xfrm>
+          <a:prstGeom prst="rect">
+            <a:avLst/>
+          </a:prstGeom>
+        </p:spPr>
+        <p:txBody>
+          <a:bodyPr wrap="square">
+            <a:spAutoFit/>
+          </a:bodyPr>
+          <a:lstStyle/>
+          <a:p>
+            <a:pPr>
+              <a:spcBef>
+                <a:spcPct val="50000"/>
+              </a:spcBef>
+            </a:pPr>
+            <a:r>
+              <a:rPr lang="en-US" dirty="0">
+                <a:solidFill>
+                  <a:srgbClr val="0070C0"/>
+                </a:solidFill>
+                <a:latin typeface="Calibri" pitchFamily="34" charset="0"/>
+              </a:rPr>
+              <a:t>Observe the actual output</a:t>
+            </a:r>
+          </a:p>
+        </p:txBody>
+      </p:sp>
+      <p:sp>
+        <p:nvSpPr>
+          <p:cNvPr id="3" name="Rectangle 2"/>
+          <p:cNvSpPr/>
+          <p:nvPr/>
+        </p:nvSpPr>
+        <p:spPr>
+          <a:xfrm>
+            <a:off x="4742240" y="2953557"/>
+            <a:ext cx="2286000" cy="646331"/>
+          </a:xfrm>
+          <a:prstGeom prst="rect">
+            <a:avLst/>
+          </a:prstGeom>
+        </p:spPr>
+        <p:txBody>
+          <a:bodyPr wrap="square">
+            <a:spAutoFit/>
+          </a:bodyPr>
+          <a:lstStyle/>
+          <a:p>
+            <a:pPr>
+              <a:spcBef>
+                <a:spcPct val="50000"/>
+              </a:spcBef>
+            </a:pPr>
+            <a:r>
+              <a:rPr lang="en-US" dirty="0">
+                <a:solidFill>
+                  <a:srgbClr val="7030A0"/>
+                </a:solidFill>
+                <a:latin typeface="Calibri" pitchFamily="34" charset="0"/>
+              </a:rPr>
+              <a:t>Compare with the expected output</a:t>
+            </a:r>
+            <a:endParaRPr lang="en-US" dirty="0">
+              <a:solidFill>
+                <a:srgbClr val="7030A0"/>
+              </a:solidFill>
+              <a:latin typeface="Calibri" pitchFamily="34" charset="0"/>
+            </a:endParaRPr>
+          </a:p>
+        </p:txBody>
+      </p:sp>
+      <p:sp>
+        <p:nvSpPr>
+          <p:cNvPr id="14" name="Rectangle 13"/>
+          <p:cNvSpPr/>
+          <p:nvPr/>
+        </p:nvSpPr>
+        <p:spPr>
+          <a:xfrm>
+            <a:off x="899592" y="4692032"/>
+            <a:ext cx="1225937" cy="923330"/>
+          </a:xfrm>
+          <a:prstGeom prst="rect">
+            <a:avLst/>
+          </a:prstGeom>
+        </p:spPr>
+        <p:txBody>
+          <a:bodyPr wrap="square">
+            <a:spAutoFit/>
+          </a:bodyPr>
+          <a:lstStyle/>
+          <a:p>
+            <a:pPr algn="r">
+              <a:spcBef>
+                <a:spcPct val="50000"/>
+              </a:spcBef>
+            </a:pPr>
+            <a:r>
+              <a:rPr lang="en-US" dirty="0">
+                <a:solidFill>
+                  <a:srgbClr val="C00000"/>
+                </a:solidFill>
+                <a:latin typeface="Calibri" pitchFamily="34" charset="0"/>
+              </a:rPr>
+              <a:t>Feed some input into the SUT</a:t>
+            </a:r>
+          </a:p>
+        </p:txBody>
+      </p:sp>
+      <p:sp>
+        <p:nvSpPr>
+          <p:cNvPr id="15" name="Bent-Up Arrow 14"/>
+          <p:cNvSpPr/>
+          <p:nvPr/>
+        </p:nvSpPr>
+        <p:spPr>
+          <a:xfrm>
+            <a:off x="5831960" y="4336653"/>
+            <a:ext cx="832886" cy="677994"/>
+          </a:xfrm>
+          <a:prstGeom prst="bentUpArrow">
+            <a:avLst/>
+          </a:prstGeom>
+          <a:solidFill>
+            <a:srgbClr val="0070C0"/>
+          </a:solidFill>
+          <a:ln>
+            <a:solidFill>
+              <a:srgbClr val="0070C0"/>
+            </a:solidFill>
+            <a:headEnd/>
+            <a:tailEnd/>
+          </a:ln>
+          <a:effectLst>
+            <a:outerShdw blurRad="63500" sx="102000" sy="102000" algn="ctr" rotWithShape="0">
+              <a:prstClr val="black">
+                <a:alpha val="40000"/>
+              </a:prstClr>
+            </a:outerShdw>
+          </a:effectLst>
         </p:spPr>
         <p:style>
           <a:lnRef idx="2">
@@ -3620,122 +3851,56 @@
           </a:fontRef>
         </p:style>
         <p:txBody>
-          <a:bodyPr rot="10800000" anchor="ctr">
-            <a:spAutoFit/>
+          <a:bodyPr anchor="ctr">
+            <a:noAutofit/>
           </a:bodyPr>
           <a:lstStyle/>
           <a:p>
             <a:pPr algn="ctr"/>
-            <a:r>
-              <a:rPr lang="en-US" sz="2000" b="0">
-                <a:solidFill>
-                  <a:schemeClr val="tx1"/>
-                </a:solidFill>
-                <a:latin typeface="Calibri" pitchFamily="34" charset="0"/>
-              </a:rPr>
-              <a:t>1</a:t>
-            </a:r>
-          </a:p>
-        </p:txBody>
-      </p:sp>
-      <p:sp>
-        <p:nvSpPr>
-          <p:cNvPr id="11" name="AutoShape 13"/>
-          <p:cNvSpPr>
-            <a:spLocks noChangeArrowheads="1"/>
-          </p:cNvSpPr>
+            <a:endParaRPr lang="en-US" sz="2000">
+              <a:solidFill>
+                <a:schemeClr val="tx1"/>
+              </a:solidFill>
+              <a:latin typeface="Calibri" pitchFamily="34" charset="0"/>
+            </a:endParaRPr>
+          </a:p>
+        </p:txBody>
+      </p:sp>
+      <p:sp>
+        <p:nvSpPr>
+          <p:cNvPr id="16" name="Bent-Up Arrow 15"/>
+          <p:cNvSpPr/>
           <p:nvPr/>
         </p:nvSpPr>
-        <p:spPr bwMode="auto">
-          <a:xfrm>
-            <a:off x="6248400" y="4246608"/>
-            <a:ext cx="1143000" cy="1025525"/>
+        <p:spPr>
+          <a:xfrm rot="5400000">
+            <a:off x="2180533" y="4325166"/>
+            <a:ext cx="820539" cy="843514"/>
           </a:xfrm>
-          <a:custGeom>
-            <a:avLst/>
-            <a:gdLst>
-              <a:gd name="T0" fmla="*/ 2147483647 w 21600"/>
-              <a:gd name="T1" fmla="*/ 0 h 21600"/>
-              <a:gd name="T2" fmla="*/ 2147483647 w 21600"/>
-              <a:gd name="T3" fmla="*/ 2147483647 h 21600"/>
-              <a:gd name="T4" fmla="*/ 0 w 21600"/>
-              <a:gd name="T5" fmla="*/ 2147483647 h 21600"/>
-              <a:gd name="T6" fmla="*/ 2147483647 w 21600"/>
-              <a:gd name="T7" fmla="*/ 2147483647 h 21600"/>
-              <a:gd name="T8" fmla="*/ 2147483647 w 21600"/>
-              <a:gd name="T9" fmla="*/ 2147483647 h 21600"/>
-              <a:gd name="T10" fmla="*/ 2147483647 w 21600"/>
-              <a:gd name="T11" fmla="*/ 2147483647 h 21600"/>
-              <a:gd name="T12" fmla="*/ 17694720 60000 65536"/>
-              <a:gd name="T13" fmla="*/ 11796480 60000 65536"/>
-              <a:gd name="T14" fmla="*/ 11796480 60000 65536"/>
-              <a:gd name="T15" fmla="*/ 5898240 60000 65536"/>
-              <a:gd name="T16" fmla="*/ 0 60000 65536"/>
-              <a:gd name="T17" fmla="*/ 0 60000 65536"/>
-              <a:gd name="T18" fmla="*/ 0 w 21600"/>
-              <a:gd name="T19" fmla="*/ 14400 h 21600"/>
-              <a:gd name="T20" fmla="*/ 18514 w 21600"/>
-              <a:gd name="T21" fmla="*/ 21600 h 21600"/>
-            </a:gdLst>
-            <a:ahLst/>
-            <a:cxnLst>
-              <a:cxn ang="T12">
-                <a:pos x="T0" y="T1"/>
-              </a:cxn>
-              <a:cxn ang="T13">
-                <a:pos x="T2" y="T3"/>
-              </a:cxn>
-              <a:cxn ang="T14">
-                <a:pos x="T4" y="T5"/>
-              </a:cxn>
-              <a:cxn ang="T15">
-                <a:pos x="T6" y="T7"/>
-              </a:cxn>
-              <a:cxn ang="T16">
-                <a:pos x="T8" y="T9"/>
-              </a:cxn>
-              <a:cxn ang="T17">
-                <a:pos x="T10" y="T11"/>
-              </a:cxn>
-            </a:cxnLst>
-            <a:rect l="T18" t="T19" r="T20" b="T21"/>
-            <a:pathLst>
-              <a:path w="21600" h="21600">
-                <a:moveTo>
-                  <a:pt x="15429" y="0"/>
-                </a:moveTo>
-                <a:lnTo>
-                  <a:pt x="9257" y="7200"/>
-                </a:lnTo>
-                <a:lnTo>
-                  <a:pt x="12343" y="7200"/>
-                </a:lnTo>
-                <a:lnTo>
-                  <a:pt x="12343" y="14400"/>
-                </a:lnTo>
-                <a:lnTo>
-                  <a:pt x="0" y="14400"/>
-                </a:lnTo>
-                <a:lnTo>
-                  <a:pt x="0" y="21600"/>
-                </a:lnTo>
-                <a:lnTo>
-                  <a:pt x="18514" y="21600"/>
-                </a:lnTo>
-                <a:lnTo>
-                  <a:pt x="18514" y="7200"/>
-                </a:lnTo>
-                <a:lnTo>
-                  <a:pt x="21600" y="7200"/>
-                </a:lnTo>
-                <a:close/>
-              </a:path>
-            </a:pathLst>
-          </a:custGeom>
+          <a:prstGeom prst="bentUpArrow">
+            <a:avLst>
+              <a:gd name="adj1" fmla="val 17841"/>
+              <a:gd name="adj2" fmla="val 19375"/>
+              <a:gd name="adj3" fmla="val 25000"/>
+            </a:avLst>
+          </a:prstGeom>
+          <a:solidFill>
+            <a:srgbClr val="C00000"/>
+          </a:solidFill>
           <a:ln>
+            <a:solidFill>
+              <a:srgbClr val="C00000"/>
+            </a:solidFill>
             <a:headEnd/>
             <a:tailEnd/>
           </a:ln>
+          <a:effectLst>
+            <a:outerShdw blurRad="63500" sx="102000" sy="102000" algn="ctr" rotWithShape="0">
+              <a:prstClr val="black">
+                <a:alpha val="40000"/>
+              </a:prstClr>
+            </a:outerShdw>
+          </a:effectLst>
         </p:spPr>
         <p:style>
           <a:lnRef idx="2">
@@ -3753,77 +3918,17 @@
         </p:style>
         <p:txBody>
           <a:bodyPr anchor="ctr">
-            <a:spAutoFit/>
+            <a:noAutofit/>
           </a:bodyPr>
           <a:lstStyle/>
           <a:p>
             <a:pPr algn="ctr"/>
-            <a:r>
-              <a:rPr lang="en-US" sz="2000" b="0">
-                <a:solidFill>
-                  <a:schemeClr val="tx1"/>
-                </a:solidFill>
-                <a:latin typeface="Calibri" pitchFamily="34" charset="0"/>
-              </a:rPr>
-              <a:t>2</a:t>
-            </a:r>
-          </a:p>
-        </p:txBody>
-      </p:sp>
-      <p:sp>
-        <p:nvSpPr>
-          <p:cNvPr id="12" name="AutoShape 14"/>
-          <p:cNvSpPr>
-            <a:spLocks noChangeArrowheads="1"/>
-          </p:cNvSpPr>
-          <p:nvPr/>
-        </p:nvSpPr>
-        <p:spPr bwMode="auto">
-          <a:xfrm>
-            <a:off x="4953000" y="3571921"/>
-            <a:ext cx="1293813" cy="720725"/>
-          </a:xfrm>
-          <a:prstGeom prst="leftRightArrow">
-            <a:avLst>
-              <a:gd name="adj1" fmla="val 50000"/>
-              <a:gd name="adj2" fmla="val 35903"/>
-            </a:avLst>
-          </a:prstGeom>
-          <a:ln>
-            <a:headEnd/>
-            <a:tailEnd/>
-          </a:ln>
-        </p:spPr>
-        <p:style>
-          <a:lnRef idx="2">
-            <a:schemeClr val="accent4"/>
-          </a:lnRef>
-          <a:fillRef idx="1">
-            <a:schemeClr val="lt1"/>
-          </a:fillRef>
-          <a:effectRef idx="0">
-            <a:schemeClr val="accent4"/>
-          </a:effectRef>
-          <a:fontRef idx="minor">
-            <a:schemeClr val="dk1"/>
-          </a:fontRef>
-        </p:style>
-        <p:txBody>
-          <a:bodyPr anchor="ctr">
-            <a:spAutoFit/>
-          </a:bodyPr>
-          <a:lstStyle/>
-          <a:p>
-            <a:pPr algn="ctr"/>
-            <a:r>
-              <a:rPr lang="en-US" sz="2000" b="0">
-                <a:solidFill>
-                  <a:schemeClr val="tx1"/>
-                </a:solidFill>
-                <a:latin typeface="Calibri" pitchFamily="34" charset="0"/>
-              </a:rPr>
-              <a:t>3</a:t>
-            </a:r>
+            <a:endParaRPr lang="en-US" sz="2000">
+              <a:solidFill>
+                <a:schemeClr val="tx1"/>
+              </a:solidFill>
+              <a:latin typeface="Calibri" pitchFamily="34" charset="0"/>
+            </a:endParaRPr>
           </a:p>
         </p:txBody>
       </p:sp>
@@ -3871,7 +3976,7 @@
                                           </p:stCondLst>
                                         </p:cTn>
                                         <p:tgtEl>
-                                          <p:spTgt spid="10"/>
+                                          <p:spTgt spid="7"/>
                                         </p:tgtEl>
                                         <p:attrNameLst>
                                           <p:attrName>style.visibility</p:attrName>
@@ -3911,78 +4016,6 @@
                                     <p:set>
                                       <p:cBhvr>
                                         <p:cTn id="10" dur="1" fill="hold">
-                                          <p:stCondLst>
-                                            <p:cond delay="0"/>
-                                          </p:stCondLst>
-                                        </p:cTn>
-                                        <p:tgtEl>
-                                          <p:spTgt spid="7"/>
-                                        </p:tgtEl>
-                                        <p:attrNameLst>
-                                          <p:attrName>style.visibility</p:attrName>
-                                        </p:attrNameLst>
-                                      </p:cBhvr>
-                                      <p:to>
-                                        <p:strVal val="visible"/>
-                                      </p:to>
-                                    </p:set>
-                                  </p:childTnLst>
-                                </p:cTn>
-                              </p:par>
-                              <p:par>
-                                <p:cTn id="11" presetID="1" presetClass="entr" presetSubtype="0" fill="hold" grpId="0" nodeType="withEffect">
-                                  <p:stCondLst>
-                                    <p:cond delay="0"/>
-                                  </p:stCondLst>
-                                  <p:childTnLst>
-                                    <p:set>
-                                      <p:cBhvr>
-                                        <p:cTn id="12" dur="1" fill="hold">
-                                          <p:stCondLst>
-                                            <p:cond delay="0"/>
-                                          </p:stCondLst>
-                                        </p:cTn>
-                                        <p:tgtEl>
-                                          <p:spTgt spid="11"/>
-                                        </p:tgtEl>
-                                        <p:attrNameLst>
-                                          <p:attrName>style.visibility</p:attrName>
-                                        </p:attrNameLst>
-                                      </p:cBhvr>
-                                      <p:to>
-                                        <p:strVal val="visible"/>
-                                      </p:to>
-                                    </p:set>
-                                  </p:childTnLst>
-                                </p:cTn>
-                              </p:par>
-                            </p:childTnLst>
-                          </p:cTn>
-                        </p:par>
-                      </p:childTnLst>
-                    </p:cTn>
-                  </p:par>
-                  <p:par>
-                    <p:cTn id="13" fill="hold">
-                      <p:stCondLst>
-                        <p:cond delay="indefinite"/>
-                      </p:stCondLst>
-                      <p:childTnLst>
-                        <p:par>
-                          <p:cTn id="14" fill="hold">
-                            <p:stCondLst>
-                              <p:cond delay="0"/>
-                            </p:stCondLst>
-                            <p:childTnLst>
-                              <p:par>
-                                <p:cTn id="15" presetID="1" presetClass="entr" presetSubtype="0" fill="hold" grpId="0" nodeType="clickEffect">
-                                  <p:stCondLst>
-                                    <p:cond delay="0"/>
-                                  </p:stCondLst>
-                                  <p:childTnLst>
-                                    <p:set>
-                                      <p:cBhvr>
-                                        <p:cTn id="16" dur="1" fill="hold">
                                           <p:stCondLst>
                                             <p:cond delay="0"/>
                                           </p:stCondLst>
@@ -4030,8 +4063,6 @@
     </p:tnLst>
     <p:bldLst>
       <p:bldP spid="7" grpId="0" animBg="1"/>
-      <p:bldP spid="10" grpId="0" animBg="1"/>
-      <p:bldP spid="11" grpId="0" animBg="1"/>
       <p:bldP spid="12" grpId="0" animBg="1"/>
     </p:bldLst>
   </p:timing>

</xml_diff>